<commit_message>
Added data model for more clarity
</commit_message>
<xml_diff>
--- a/db/TGP IV - Data Model - 20220217.pptx
+++ b/db/TGP IV - Data Model - 20220217.pptx
@@ -3357,6 +3357,16 @@
           <a:prstGeom prst="rect">
             <a:avLst/>
           </a:prstGeom>
+          <a:solidFill>
+            <a:schemeClr val="accent1"/>
+          </a:solidFill>
+          <a:ln w="38100">
+            <a:solidFill>
+              <a:schemeClr val="accent1">
+                <a:lumMod val="50000"/>
+              </a:schemeClr>
+            </a:solidFill>
+          </a:ln>
         </p:spPr>
         <p:style>
           <a:lnRef idx="2">
@@ -3541,12 +3551,22 @@
         </p:nvSpPr>
         <p:spPr>
           <a:xfrm>
-            <a:off x="1802860" y="570690"/>
+            <a:off x="1786645" y="570690"/>
             <a:ext cx="1420238" cy="859277"/>
           </a:xfrm>
           <a:prstGeom prst="rect">
             <a:avLst/>
           </a:prstGeom>
+          <a:solidFill>
+            <a:schemeClr val="accent1"/>
+          </a:solidFill>
+          <a:ln w="38100">
+            <a:solidFill>
+              <a:schemeClr val="accent1">
+                <a:lumMod val="50000"/>
+              </a:schemeClr>
+            </a:solidFill>
+          </a:ln>
         </p:spPr>
         <p:style>
           <a:lnRef idx="2">
@@ -3635,6 +3655,16 @@
           <a:prstGeom prst="rect">
             <a:avLst/>
           </a:prstGeom>
+          <a:solidFill>
+            <a:schemeClr val="accent6"/>
+          </a:solidFill>
+          <a:ln w="38100">
+            <a:solidFill>
+              <a:schemeClr val="accent6">
+                <a:lumMod val="50000"/>
+              </a:schemeClr>
+            </a:solidFill>
+          </a:ln>
         </p:spPr>
         <p:style>
           <a:lnRef idx="2">
@@ -3735,12 +3765,24 @@
         </p:nvSpPr>
         <p:spPr>
           <a:xfrm>
-            <a:off x="1802860" y="1979580"/>
+            <a:off x="1786645" y="2471636"/>
             <a:ext cx="1420238" cy="1449420"/>
           </a:xfrm>
           <a:prstGeom prst="rect">
             <a:avLst/>
           </a:prstGeom>
+          <a:solidFill>
+            <a:schemeClr val="bg2">
+              <a:lumMod val="75000"/>
+            </a:schemeClr>
+          </a:solidFill>
+          <a:ln w="38100">
+            <a:solidFill>
+              <a:schemeClr val="bg2">
+                <a:lumMod val="50000"/>
+              </a:schemeClr>
+            </a:solidFill>
+          </a:ln>
         </p:spPr>
         <p:style>
           <a:lnRef idx="2">
@@ -3900,12 +3942,22 @@
         </p:nvSpPr>
         <p:spPr>
           <a:xfrm>
-            <a:off x="7548664" y="5076216"/>
+            <a:off x="7548664" y="5131338"/>
             <a:ext cx="1420238" cy="1211094"/>
           </a:xfrm>
           <a:prstGeom prst="rect">
             <a:avLst/>
           </a:prstGeom>
+          <a:solidFill>
+            <a:schemeClr val="accent6"/>
+          </a:solidFill>
+          <a:ln w="38100">
+            <a:solidFill>
+              <a:schemeClr val="accent6">
+                <a:lumMod val="50000"/>
+              </a:schemeClr>
+            </a:solidFill>
+          </a:ln>
         </p:spPr>
         <p:style>
           <a:lnRef idx="2">
@@ -4036,12 +4088,22 @@
         </p:nvSpPr>
         <p:spPr>
           <a:xfrm>
-            <a:off x="4698460" y="4940532"/>
+            <a:off x="4675762" y="4995654"/>
             <a:ext cx="1420238" cy="1346778"/>
           </a:xfrm>
           <a:prstGeom prst="rect">
             <a:avLst/>
           </a:prstGeom>
+          <a:solidFill>
+            <a:schemeClr val="accent2"/>
+          </a:solidFill>
+          <a:ln w="38100">
+            <a:solidFill>
+              <a:schemeClr val="accent2">
+                <a:lumMod val="50000"/>
+              </a:schemeClr>
+            </a:solidFill>
+          </a:ln>
         </p:spPr>
         <p:style>
           <a:lnRef idx="2">
@@ -4170,12 +4232,20 @@
         </p:nvSpPr>
         <p:spPr>
           <a:xfrm>
-            <a:off x="1065179" y="4889211"/>
+            <a:off x="1786645" y="4893012"/>
             <a:ext cx="1420238" cy="1449420"/>
           </a:xfrm>
           <a:prstGeom prst="rect">
             <a:avLst/>
           </a:prstGeom>
+          <a:solidFill>
+            <a:srgbClr val="990099"/>
+          </a:solidFill>
+          <a:ln w="38100">
+            <a:solidFill>
+              <a:srgbClr val="660066"/>
+            </a:solidFill>
+          </a:ln>
         </p:spPr>
         <p:style>
           <a:lnRef idx="2">
@@ -4334,15 +4404,22 @@
         </p:nvSpPr>
         <p:spPr>
           <a:xfrm>
-            <a:off x="7600545" y="570690"/>
+            <a:off x="7548664" y="570690"/>
             <a:ext cx="1922834" cy="1744068"/>
           </a:xfrm>
           <a:prstGeom prst="rect">
             <a:avLst/>
           </a:prstGeom>
           <a:solidFill>
-            <a:srgbClr val="C00000"/>
+            <a:schemeClr val="accent4"/>
           </a:solidFill>
+          <a:ln w="38100">
+            <a:solidFill>
+              <a:schemeClr val="accent4">
+                <a:lumMod val="50000"/>
+              </a:schemeClr>
+            </a:solidFill>
+          </a:ln>
         </p:spPr>
         <p:style>
           <a:lnRef idx="2">
@@ -4366,142 +4443,274 @@
           <a:p>
             <a:pPr algn="ctr"/>
             <a:r>
-              <a:rPr lang="fr-FR" sz="1200" b="1" dirty="0"/>
+              <a:rPr lang="fr-FR" sz="1200" b="1" dirty="0">
+                <a:solidFill>
+                  <a:schemeClr val="tx1"/>
+                </a:solidFill>
+              </a:rPr>
               <a:t>PRIVATE_MESSAGES</a:t>
             </a:r>
           </a:p>
           <a:p>
-            <a:endParaRPr lang="fr-FR" sz="900" dirty="0"/>
-          </a:p>
-          <a:p>
-            <a:r>
-              <a:rPr lang="fr-FR" sz="900" dirty="0" err="1"/>
+            <a:endParaRPr lang="fr-FR" sz="900" dirty="0">
+              <a:solidFill>
+                <a:schemeClr val="tx1"/>
+              </a:solidFill>
+            </a:endParaRPr>
+          </a:p>
+          <a:p>
+            <a:r>
+              <a:rPr lang="fr-FR" sz="900" dirty="0" err="1">
+                <a:solidFill>
+                  <a:schemeClr val="tx1"/>
+                </a:solidFill>
+              </a:rPr>
               <a:t>Private_message_id</a:t>
             </a:r>
             <a:r>
-              <a:rPr lang="fr-FR" sz="900" dirty="0"/>
+              <a:rPr lang="fr-FR" sz="900" dirty="0">
+                <a:solidFill>
+                  <a:schemeClr val="tx1"/>
+                </a:solidFill>
+              </a:rPr>
               <a:t> : </a:t>
             </a:r>
             <a:r>
-              <a:rPr lang="fr-FR" sz="900" dirty="0" err="1"/>
+              <a:rPr lang="fr-FR" sz="900" dirty="0" err="1">
+                <a:solidFill>
+                  <a:schemeClr val="tx1"/>
+                </a:solidFill>
+              </a:rPr>
               <a:t>integer</a:t>
             </a:r>
             <a:r>
-              <a:rPr lang="fr-FR" sz="900" dirty="0"/>
+              <a:rPr lang="fr-FR" sz="900" dirty="0">
+                <a:solidFill>
+                  <a:schemeClr val="tx1"/>
+                </a:solidFill>
+              </a:rPr>
               <a:t> (PK)</a:t>
             </a:r>
           </a:p>
           <a:p>
             <a:r>
-              <a:rPr lang="fr-FR" sz="900" dirty="0"/>
+              <a:rPr lang="fr-FR" sz="900" dirty="0">
+                <a:solidFill>
+                  <a:schemeClr val="tx1"/>
+                </a:solidFill>
+              </a:rPr>
               <a:t>Object : string</a:t>
             </a:r>
           </a:p>
           <a:p>
             <a:r>
-              <a:rPr lang="fr-FR" sz="900" dirty="0"/>
+              <a:rPr lang="fr-FR" sz="900" dirty="0">
+                <a:solidFill>
+                  <a:schemeClr val="tx1"/>
+                </a:solidFill>
+              </a:rPr>
               <a:t>Body : </a:t>
             </a:r>
             <a:r>
-              <a:rPr lang="fr-FR" sz="900" dirty="0" err="1"/>
+              <a:rPr lang="fr-FR" sz="900" dirty="0" err="1">
+                <a:solidFill>
+                  <a:schemeClr val="tx1"/>
+                </a:solidFill>
+              </a:rPr>
               <a:t>text</a:t>
             </a:r>
-            <a:endParaRPr lang="fr-FR" sz="900" dirty="0"/>
-          </a:p>
-          <a:p>
-            <a:r>
-              <a:rPr lang="fr-FR" sz="900" dirty="0"/>
+            <a:endParaRPr lang="fr-FR" sz="900" dirty="0">
+              <a:solidFill>
+                <a:schemeClr val="tx1"/>
+              </a:solidFill>
+            </a:endParaRPr>
+          </a:p>
+          <a:p>
+            <a:r>
+              <a:rPr lang="fr-FR" sz="900" dirty="0">
+                <a:solidFill>
+                  <a:schemeClr val="tx1"/>
+                </a:solidFill>
+              </a:rPr>
               <a:t>Read : </a:t>
             </a:r>
             <a:r>
-              <a:rPr lang="fr-FR" sz="900" dirty="0" err="1"/>
+              <a:rPr lang="fr-FR" sz="900" dirty="0" err="1">
+                <a:solidFill>
+                  <a:schemeClr val="tx1"/>
+                </a:solidFill>
+              </a:rPr>
               <a:t>boolean</a:t>
             </a:r>
-            <a:endParaRPr lang="fr-FR" sz="900" dirty="0"/>
-          </a:p>
-          <a:p>
-            <a:r>
-              <a:rPr lang="fr-FR" sz="900" dirty="0" err="1"/>
+            <a:endParaRPr lang="fr-FR" sz="900" dirty="0">
+              <a:solidFill>
+                <a:schemeClr val="tx1"/>
+              </a:solidFill>
+            </a:endParaRPr>
+          </a:p>
+          <a:p>
+            <a:r>
+              <a:rPr lang="fr-FR" sz="900" dirty="0" err="1">
+                <a:solidFill>
+                  <a:schemeClr val="tx1"/>
+                </a:solidFill>
+              </a:rPr>
               <a:t>Sender_id</a:t>
             </a:r>
             <a:r>
-              <a:rPr lang="fr-FR" sz="900" dirty="0"/>
+              <a:rPr lang="fr-FR" sz="900" dirty="0">
+                <a:solidFill>
+                  <a:schemeClr val="tx1"/>
+                </a:solidFill>
+              </a:rPr>
               <a:t> : </a:t>
             </a:r>
             <a:r>
-              <a:rPr lang="fr-FR" sz="900" dirty="0" err="1"/>
+              <a:rPr lang="fr-FR" sz="900" dirty="0" err="1">
+                <a:solidFill>
+                  <a:schemeClr val="tx1"/>
+                </a:solidFill>
+              </a:rPr>
               <a:t>integer</a:t>
             </a:r>
             <a:r>
-              <a:rPr lang="fr-FR" sz="900" dirty="0"/>
+              <a:rPr lang="fr-FR" sz="900" dirty="0">
+                <a:solidFill>
+                  <a:schemeClr val="tx1"/>
+                </a:solidFill>
+              </a:rPr>
               <a:t> (FK)</a:t>
             </a:r>
           </a:p>
           <a:p>
             <a:r>
-              <a:rPr lang="fr-FR" sz="900" dirty="0" err="1"/>
+              <a:rPr lang="fr-FR" sz="900" dirty="0" err="1">
+                <a:solidFill>
+                  <a:schemeClr val="tx1"/>
+                </a:solidFill>
+              </a:rPr>
               <a:t>Recipient_id</a:t>
             </a:r>
             <a:r>
-              <a:rPr lang="fr-FR" sz="900" dirty="0"/>
+              <a:rPr lang="fr-FR" sz="900" dirty="0">
+                <a:solidFill>
+                  <a:schemeClr val="tx1"/>
+                </a:solidFill>
+              </a:rPr>
               <a:t> : </a:t>
             </a:r>
             <a:r>
-              <a:rPr lang="fr-FR" sz="900" dirty="0" err="1"/>
+              <a:rPr lang="fr-FR" sz="900" dirty="0" err="1">
+                <a:solidFill>
+                  <a:schemeClr val="tx1"/>
+                </a:solidFill>
+              </a:rPr>
               <a:t>integer</a:t>
             </a:r>
             <a:r>
-              <a:rPr lang="fr-FR" sz="900" dirty="0"/>
+              <a:rPr lang="fr-FR" sz="900" dirty="0">
+                <a:solidFill>
+                  <a:schemeClr val="tx1"/>
+                </a:solidFill>
+              </a:rPr>
               <a:t>(FK)</a:t>
             </a:r>
           </a:p>
           <a:p>
             <a:r>
-              <a:rPr lang="fr-FR" sz="900" dirty="0" err="1"/>
+              <a:rPr lang="fr-FR" sz="900" dirty="0" err="1">
+                <a:solidFill>
+                  <a:schemeClr val="tx1"/>
+                </a:solidFill>
+              </a:rPr>
               <a:t>Previous_message</a:t>
             </a:r>
             <a:r>
-              <a:rPr lang="fr-FR" sz="900" dirty="0"/>
+              <a:rPr lang="fr-FR" sz="900" dirty="0">
+                <a:solidFill>
+                  <a:schemeClr val="tx1"/>
+                </a:solidFill>
+              </a:rPr>
               <a:t> : </a:t>
             </a:r>
             <a:r>
-              <a:rPr lang="fr-FR" sz="900" dirty="0" err="1"/>
+              <a:rPr lang="fr-FR" sz="900" dirty="0" err="1">
+                <a:solidFill>
+                  <a:schemeClr val="tx1"/>
+                </a:solidFill>
+              </a:rPr>
               <a:t>integer</a:t>
             </a:r>
             <a:r>
-              <a:rPr lang="fr-FR" sz="900" dirty="0"/>
+              <a:rPr lang="fr-FR" sz="900" dirty="0">
+                <a:solidFill>
+                  <a:schemeClr val="tx1"/>
+                </a:solidFill>
+              </a:rPr>
               <a:t>(FK)</a:t>
             </a:r>
           </a:p>
           <a:p>
             <a:r>
-              <a:rPr lang="fr-FR" sz="900" dirty="0" err="1"/>
+              <a:rPr lang="fr-FR" sz="900" dirty="0" err="1">
+                <a:solidFill>
+                  <a:schemeClr val="tx1"/>
+                </a:solidFill>
+              </a:rPr>
               <a:t>Creatd_at</a:t>
             </a:r>
             <a:r>
-              <a:rPr lang="fr-FR" sz="900" dirty="0"/>
+              <a:rPr lang="fr-FR" sz="900" dirty="0">
+                <a:solidFill>
+                  <a:schemeClr val="tx1"/>
+                </a:solidFill>
+              </a:rPr>
               <a:t> : </a:t>
             </a:r>
             <a:r>
-              <a:rPr lang="fr-FR" sz="900" dirty="0" err="1"/>
+              <a:rPr lang="fr-FR" sz="900" dirty="0" err="1">
+                <a:solidFill>
+                  <a:schemeClr val="tx1"/>
+                </a:solidFill>
+              </a:rPr>
               <a:t>datetime</a:t>
             </a:r>
-            <a:endParaRPr lang="fr-FR" sz="900" dirty="0"/>
-          </a:p>
-          <a:p>
-            <a:r>
-              <a:rPr lang="fr-FR" sz="900" dirty="0" err="1"/>
+            <a:endParaRPr lang="fr-FR" sz="900" dirty="0">
+              <a:solidFill>
+                <a:schemeClr val="tx1"/>
+              </a:solidFill>
+            </a:endParaRPr>
+          </a:p>
+          <a:p>
+            <a:r>
+              <a:rPr lang="fr-FR" sz="900" dirty="0" err="1">
+                <a:solidFill>
+                  <a:schemeClr val="tx1"/>
+                </a:solidFill>
+              </a:rPr>
               <a:t>Updated_at</a:t>
             </a:r>
             <a:r>
-              <a:rPr lang="fr-FR" sz="900" dirty="0"/>
+              <a:rPr lang="fr-FR" sz="900" dirty="0">
+                <a:solidFill>
+                  <a:schemeClr val="tx1"/>
+                </a:solidFill>
+              </a:rPr>
               <a:t> : </a:t>
             </a:r>
             <a:r>
-              <a:rPr lang="fr-FR" sz="900" dirty="0" err="1"/>
+              <a:rPr lang="fr-FR" sz="900" dirty="0" err="1">
+                <a:solidFill>
+                  <a:schemeClr val="tx1"/>
+                </a:solidFill>
+              </a:rPr>
               <a:t>datetime</a:t>
             </a:r>
-            <a:endParaRPr lang="fr-FR" sz="900" dirty="0"/>
+            <a:endParaRPr lang="fr-FR" sz="900" dirty="0">
+              <a:solidFill>
+                <a:schemeClr val="tx1"/>
+              </a:solidFill>
+            </a:endParaRPr>
           </a:p>
         </p:txBody>
       </p:sp>
@@ -4522,8 +4731,8 @@
         </p:nvCxnSpPr>
         <p:spPr>
           <a:xfrm rot="10800000">
-            <a:off x="3223098" y="1000330"/>
-            <a:ext cx="1452664" cy="1947153"/>
+            <a:off x="3206884" y="1000330"/>
+            <a:ext cx="1468879" cy="1947153"/>
           </a:xfrm>
           <a:prstGeom prst="bentConnector3">
             <a:avLst/>
@@ -4566,9 +4775,9 @@
           <p:nvPr/>
         </p:nvCxnSpPr>
         <p:spPr>
-          <a:xfrm rot="16200000" flipH="1">
-            <a:off x="4884656" y="4416609"/>
-            <a:ext cx="1025148" cy="22698"/>
+          <a:xfrm rot="5400000">
+            <a:off x="4845746" y="4455519"/>
+            <a:ext cx="1080270" cy="12700"/>
           </a:xfrm>
           <a:prstGeom prst="bentConnector3">
             <a:avLst/>
@@ -4614,8 +4823,8 @@
         </p:nvCxnSpPr>
         <p:spPr>
           <a:xfrm rot="10800000">
-            <a:off x="6118698" y="5613921"/>
-            <a:ext cx="1429966" cy="67842"/>
+            <a:off x="6096000" y="5669043"/>
+            <a:ext cx="1452664" cy="67842"/>
           </a:xfrm>
           <a:prstGeom prst="bentConnector3">
             <a:avLst/>
@@ -4661,8 +4870,57 @@
         </p:nvCxnSpPr>
         <p:spPr>
           <a:xfrm rot="5400000">
-            <a:off x="7915073" y="4732506"/>
-            <a:ext cx="687420" cy="12700"/>
+            <a:off x="7887512" y="4760067"/>
+            <a:ext cx="742542" cy="12700"/>
+          </a:xfrm>
+          <a:prstGeom prst="bentConnector3">
+            <a:avLst>
+              <a:gd name="adj1" fmla="val 50000"/>
+            </a:avLst>
+          </a:prstGeom>
+          <a:ln>
+            <a:solidFill>
+              <a:schemeClr val="accent6"/>
+            </a:solidFill>
+            <a:headEnd type="triangle" w="med" len="med"/>
+            <a:tailEnd type="triangle" w="med" len="med"/>
+          </a:ln>
+        </p:spPr>
+        <p:style>
+          <a:lnRef idx="1">
+            <a:schemeClr val="accent1"/>
+          </a:lnRef>
+          <a:fillRef idx="0">
+            <a:schemeClr val="accent1"/>
+          </a:fillRef>
+          <a:effectRef idx="0">
+            <a:schemeClr val="accent1"/>
+          </a:effectRef>
+          <a:fontRef idx="minor">
+            <a:schemeClr val="tx1"/>
+          </a:fontRef>
+        </p:style>
+      </p:cxnSp>
+      <p:cxnSp>
+        <p:nvCxnSpPr>
+          <p:cNvPr id="36" name="Connecteur : en angle 35">
+            <a:extLst>
+              <a:ext uri="{FF2B5EF4-FFF2-40B4-BE49-F238E27FC236}">
+                <a16:creationId xmlns:a16="http://schemas.microsoft.com/office/drawing/2014/main" id="{EAAD2B3A-8A21-4F5C-A69B-56C4DA36F065}"/>
+              </a:ext>
+            </a:extLst>
+          </p:cNvPr>
+          <p:cNvCxnSpPr>
+            <a:cxnSpLocks/>
+            <a:stCxn id="9" idx="3"/>
+            <a:endCxn id="15" idx="1"/>
+          </p:cNvCxnSpPr>
+          <p:nvPr/>
+        </p:nvCxnSpPr>
+        <p:spPr>
+          <a:xfrm>
+            <a:off x="3206883" y="3196346"/>
+            <a:ext cx="1468879" cy="2472697"/>
           </a:xfrm>
           <a:prstGeom prst="bentConnector3">
             <a:avLst>
@@ -4694,55 +4952,6 @@
       </p:cxnSp>
       <p:cxnSp>
         <p:nvCxnSpPr>
-          <p:cNvPr id="36" name="Connecteur : en angle 35">
-            <a:extLst>
-              <a:ext uri="{FF2B5EF4-FFF2-40B4-BE49-F238E27FC236}">
-                <a16:creationId xmlns:a16="http://schemas.microsoft.com/office/drawing/2014/main" id="{EAAD2B3A-8A21-4F5C-A69B-56C4DA36F065}"/>
-              </a:ext>
-            </a:extLst>
-          </p:cNvPr>
-          <p:cNvCxnSpPr>
-            <a:cxnSpLocks/>
-            <a:stCxn id="9" idx="3"/>
-            <a:endCxn id="15" idx="1"/>
-          </p:cNvCxnSpPr>
-          <p:nvPr/>
-        </p:nvCxnSpPr>
-        <p:spPr>
-          <a:xfrm>
-            <a:off x="3223098" y="2704290"/>
-            <a:ext cx="1475362" cy="2909631"/>
-          </a:xfrm>
-          <a:prstGeom prst="bentConnector3">
-            <a:avLst>
-              <a:gd name="adj1" fmla="val 30220"/>
-            </a:avLst>
-          </a:prstGeom>
-          <a:ln>
-            <a:solidFill>
-              <a:schemeClr val="tx1"/>
-            </a:solidFill>
-            <a:headEnd type="triangle" w="med" len="med"/>
-            <a:tailEnd type="triangle" w="med" len="med"/>
-          </a:ln>
-        </p:spPr>
-        <p:style>
-          <a:lnRef idx="1">
-            <a:schemeClr val="accent1"/>
-          </a:lnRef>
-          <a:fillRef idx="0">
-            <a:schemeClr val="accent1"/>
-          </a:fillRef>
-          <a:effectRef idx="0">
-            <a:schemeClr val="accent1"/>
-          </a:effectRef>
-          <a:fontRef idx="minor">
-            <a:schemeClr val="tx1"/>
-          </a:fontRef>
-        </p:style>
-      </p:cxnSp>
-      <p:cxnSp>
-        <p:nvCxnSpPr>
           <p:cNvPr id="40" name="Connecteur : en angle 39">
             <a:extLst>
               <a:ext uri="{FF2B5EF4-FFF2-40B4-BE49-F238E27FC236}">
@@ -4759,7 +4968,7 @@
         </p:nvCxnSpPr>
         <p:spPr>
           <a:xfrm rot="10800000" flipH="1">
-            <a:off x="1802859" y="1979580"/>
+            <a:off x="1786644" y="2471636"/>
             <a:ext cx="710119" cy="724710"/>
           </a:xfrm>
           <a:prstGeom prst="bentConnector4">
@@ -4809,8 +5018,8 @@
         </p:nvCxnSpPr>
         <p:spPr>
           <a:xfrm rot="5400000" flipH="1" flipV="1">
-            <a:off x="1414033" y="3790266"/>
-            <a:ext cx="1460211" cy="737681"/>
+            <a:off x="2010786" y="4407034"/>
+            <a:ext cx="971956" cy="12700"/>
           </a:xfrm>
           <a:prstGeom prst="bentConnector3">
             <a:avLst>
@@ -4858,13 +5067,13 @@
         </p:nvCxnSpPr>
         <p:spPr>
           <a:xfrm>
-            <a:off x="2485417" y="5613921"/>
-            <a:ext cx="2923162" cy="673389"/>
+            <a:off x="3206883" y="5617722"/>
+            <a:ext cx="2178998" cy="724710"/>
           </a:xfrm>
           <a:prstGeom prst="bentConnector4">
             <a:avLst>
-              <a:gd name="adj1" fmla="val 22546"/>
-              <a:gd name="adj2" fmla="val 133948"/>
+              <a:gd name="adj1" fmla="val 33705"/>
+              <a:gd name="adj2" fmla="val 131544"/>
             </a:avLst>
           </a:prstGeom>
           <a:ln>
@@ -4908,8 +5117,8 @@
         </p:nvCxnSpPr>
         <p:spPr>
           <a:xfrm rot="16200000" flipH="1" flipV="1">
-            <a:off x="6269477" y="-312906"/>
-            <a:ext cx="1408890" cy="3176081"/>
+            <a:off x="6243536" y="-286965"/>
+            <a:ext cx="1408890" cy="3124200"/>
           </a:xfrm>
           <a:prstGeom prst="bentConnector3">
             <a:avLst>
@@ -4918,10 +5127,10 @@
           </a:prstGeom>
           <a:ln>
             <a:solidFill>
-              <a:srgbClr val="C00000"/>
+              <a:schemeClr val="tx1"/>
             </a:solidFill>
             <a:headEnd type="triangle" w="med" len="med"/>
-            <a:tailEnd type="triangle" w="med" len="med"/>
+            <a:tailEnd type="none" w="med" len="med"/>
           </a:ln>
         </p:spPr>
         <p:style>
@@ -4951,23 +5160,25 @@
           <p:cNvCxnSpPr>
             <a:cxnSpLocks/>
             <a:stCxn id="23" idx="1"/>
-            <a:endCxn id="6" idx="0"/>
+            <a:endCxn id="6" idx="3"/>
           </p:cNvCxnSpPr>
           <p:nvPr/>
         </p:nvCxnSpPr>
         <p:spPr>
           <a:xfrm rot="10800000" flipV="1">
-            <a:off x="5385881" y="1442724"/>
-            <a:ext cx="2214664" cy="536856"/>
+            <a:off x="6096000" y="1442724"/>
+            <a:ext cx="1452664" cy="1504758"/>
           </a:xfrm>
-          <a:prstGeom prst="bentConnector2">
-            <a:avLst/>
+          <a:prstGeom prst="bentConnector3">
+            <a:avLst>
+              <a:gd name="adj1" fmla="val 50000"/>
+            </a:avLst>
           </a:prstGeom>
           <a:ln>
             <a:solidFill>
-              <a:srgbClr val="C00000"/>
+              <a:schemeClr val="tx1"/>
             </a:solidFill>
-            <a:headEnd type="triangle" w="med" len="med"/>
+            <a:headEnd type="none" w="med" len="med"/>
             <a:tailEnd type="triangle" w="med" len="med"/>
           </a:ln>
         </p:spPr>
@@ -5004,18 +5215,20 @@
         </p:nvCxnSpPr>
         <p:spPr>
           <a:xfrm rot="5400000" flipH="1" flipV="1">
-            <a:off x="8606653" y="1398032"/>
+            <a:off x="8554772" y="1398032"/>
             <a:ext cx="872034" cy="961417"/>
           </a:xfrm>
           <a:prstGeom prst="bentConnector4">
             <a:avLst>
-              <a:gd name="adj1" fmla="val -65258"/>
-              <a:gd name="adj2" fmla="val 171332"/>
+              <a:gd name="adj1" fmla="val -67489"/>
+              <a:gd name="adj2" fmla="val 149072"/>
             </a:avLst>
           </a:prstGeom>
           <a:ln>
             <a:solidFill>
-              <a:srgbClr val="C00000"/>
+              <a:schemeClr val="accent4">
+                <a:lumMod val="75000"/>
+              </a:schemeClr>
             </a:solidFill>
             <a:headEnd type="triangle" w="med" len="med"/>
             <a:tailEnd type="triangle" w="med" len="med"/>
@@ -5036,6 +5249,131 @@
           </a:fontRef>
         </p:style>
       </p:cxnSp>
+      <p:sp>
+        <p:nvSpPr>
+          <p:cNvPr id="30" name="Rectangle 29">
+            <a:extLst>
+              <a:ext uri="{FF2B5EF4-FFF2-40B4-BE49-F238E27FC236}">
+                <a16:creationId xmlns:a16="http://schemas.microsoft.com/office/drawing/2014/main" id="{FE0BCA47-A6DA-44C1-9F2C-0252C2F0F67A}"/>
+              </a:ext>
+            </a:extLst>
+          </p:cNvPr>
+          <p:cNvSpPr/>
+          <p:nvPr/>
+        </p:nvSpPr>
+        <p:spPr>
+          <a:xfrm rot="16200000">
+            <a:off x="-2088946" y="2967335"/>
+            <a:ext cx="5501378" cy="923330"/>
+          </a:xfrm>
+          <a:prstGeom prst="rect">
+            <a:avLst/>
+          </a:prstGeom>
+          <a:noFill/>
+        </p:spPr>
+        <p:txBody>
+          <a:bodyPr wrap="none" lIns="91440" tIns="45720" rIns="91440" bIns="45720">
+            <a:spAutoFit/>
+          </a:bodyPr>
+          <a:lstStyle/>
+          <a:p>
+            <a:pPr algn="ctr"/>
+            <a:r>
+              <a:rPr lang="fr-FR" sz="5400" b="1" cap="none" spc="0" dirty="0">
+                <a:ln w="12700">
+                  <a:solidFill>
+                    <a:schemeClr val="tx2">
+                      <a:lumMod val="75000"/>
+                    </a:schemeClr>
+                  </a:solidFill>
+                  <a:prstDash val="solid"/>
+                </a:ln>
+                <a:pattFill prst="dkUpDiag">
+                  <a:fgClr>
+                    <a:schemeClr val="tx2"/>
+                  </a:fgClr>
+                  <a:bgClr>
+                    <a:schemeClr val="tx2">
+                      <a:lumMod val="20000"/>
+                      <a:lumOff val="80000"/>
+                    </a:schemeClr>
+                  </a:bgClr>
+                </a:pattFill>
+                <a:effectLst>
+                  <a:outerShdw dist="38100" dir="2640000" algn="bl" rotWithShape="0">
+                    <a:schemeClr val="tx2">
+                      <a:lumMod val="75000"/>
+                    </a:schemeClr>
+                  </a:outerShdw>
+                </a:effectLst>
+              </a:rPr>
+              <a:t>The </a:t>
+            </a:r>
+            <a:r>
+              <a:rPr lang="fr-FR" sz="5400" b="1" cap="none" spc="0" dirty="0" err="1">
+                <a:ln w="12700">
+                  <a:solidFill>
+                    <a:schemeClr val="tx2">
+                      <a:lumMod val="75000"/>
+                    </a:schemeClr>
+                  </a:solidFill>
+                  <a:prstDash val="solid"/>
+                </a:ln>
+                <a:pattFill prst="dkUpDiag">
+                  <a:fgClr>
+                    <a:schemeClr val="tx2"/>
+                  </a:fgClr>
+                  <a:bgClr>
+                    <a:schemeClr val="tx2">
+                      <a:lumMod val="20000"/>
+                      <a:lumOff val="80000"/>
+                    </a:schemeClr>
+                  </a:bgClr>
+                </a:pattFill>
+                <a:effectLst>
+                  <a:outerShdw dist="38100" dir="2640000" algn="bl" rotWithShape="0">
+                    <a:schemeClr val="tx2">
+                      <a:lumMod val="75000"/>
+                    </a:schemeClr>
+                  </a:outerShdw>
+                </a:effectLst>
+              </a:rPr>
+              <a:t>Gossip</a:t>
+            </a:r>
+            <a:r>
+              <a:rPr lang="fr-FR" sz="5400" b="1" cap="none" spc="0" dirty="0">
+                <a:ln w="12700">
+                  <a:solidFill>
+                    <a:schemeClr val="tx2">
+                      <a:lumMod val="75000"/>
+                    </a:schemeClr>
+                  </a:solidFill>
+                  <a:prstDash val="solid"/>
+                </a:ln>
+                <a:pattFill prst="dkUpDiag">
+                  <a:fgClr>
+                    <a:schemeClr val="tx2"/>
+                  </a:fgClr>
+                  <a:bgClr>
+                    <a:schemeClr val="tx2">
+                      <a:lumMod val="20000"/>
+                      <a:lumOff val="80000"/>
+                    </a:schemeClr>
+                  </a:bgClr>
+                </a:pattFill>
+                <a:effectLst>
+                  <a:outerShdw dist="38100" dir="2640000" algn="bl" rotWithShape="0">
+                    <a:schemeClr val="tx2">
+                      <a:lumMod val="75000"/>
+                    </a:schemeClr>
+                  </a:outerShdw>
+                </a:effectLst>
+              </a:rPr>
+              <a:t> Project</a:t>
+            </a:r>
+          </a:p>
+        </p:txBody>
+      </p:sp>
     </p:spTree>
     <p:extLst>
       <p:ext uri="{BB962C8B-B14F-4D97-AF65-F5344CB8AC3E}">

</xml_diff>